<commit_message>
Rewrite the answer of S4 and Tetrahedron symmetry
</commit_message>
<xml_diff>
--- a/appendix/answer/img/S4.pptx
+++ b/appendix/answer/img/S4.pptx
@@ -104,6 +104,11 @@
       </a:defRPr>
     </a:lvl9pPr>
   </p:defaultTextStyle>
+  <p:extLst>
+    <p:ext uri="{EFAFB233-063F-42B5-8137-9DF3F51BA10A}">
+      <p15:sldGuideLst xmlns:p15="http://schemas.microsoft.com/office/powerpoint/2012/main"/>
+    </p:ext>
+  </p:extLst>
 </p:presentation>
 </file>
 
@@ -256,7 +261,7 @@
           <a:p>
             <a:fld id="{D09E5AC5-2EF2-5D48-869F-6D9756F06D66}" type="datetimeFigureOut">
               <a:rPr lang="en-CN" smtClean="0"/>
-              <a:t>2020/12/5</a:t>
+              <a:t>2020/12/11</a:t>
             </a:fld>
             <a:endParaRPr lang="en-CN"/>
           </a:p>
@@ -456,7 +461,7 @@
           <a:p>
             <a:fld id="{D09E5AC5-2EF2-5D48-869F-6D9756F06D66}" type="datetimeFigureOut">
               <a:rPr lang="en-CN" smtClean="0"/>
-              <a:t>2020/12/5</a:t>
+              <a:t>2020/12/11</a:t>
             </a:fld>
             <a:endParaRPr lang="en-CN"/>
           </a:p>
@@ -666,7 +671,7 @@
           <a:p>
             <a:fld id="{D09E5AC5-2EF2-5D48-869F-6D9756F06D66}" type="datetimeFigureOut">
               <a:rPr lang="en-CN" smtClean="0"/>
-              <a:t>2020/12/5</a:t>
+              <a:t>2020/12/11</a:t>
             </a:fld>
             <a:endParaRPr lang="en-CN"/>
           </a:p>
@@ -866,7 +871,7 @@
           <a:p>
             <a:fld id="{D09E5AC5-2EF2-5D48-869F-6D9756F06D66}" type="datetimeFigureOut">
               <a:rPr lang="en-CN" smtClean="0"/>
-              <a:t>2020/12/5</a:t>
+              <a:t>2020/12/11</a:t>
             </a:fld>
             <a:endParaRPr lang="en-CN"/>
           </a:p>
@@ -1142,7 +1147,7 @@
           <a:p>
             <a:fld id="{D09E5AC5-2EF2-5D48-869F-6D9756F06D66}" type="datetimeFigureOut">
               <a:rPr lang="en-CN" smtClean="0"/>
-              <a:t>2020/12/5</a:t>
+              <a:t>2020/12/11</a:t>
             </a:fld>
             <a:endParaRPr lang="en-CN"/>
           </a:p>
@@ -1410,7 +1415,7 @@
           <a:p>
             <a:fld id="{D09E5AC5-2EF2-5D48-869F-6D9756F06D66}" type="datetimeFigureOut">
               <a:rPr lang="en-CN" smtClean="0"/>
-              <a:t>2020/12/5</a:t>
+              <a:t>2020/12/11</a:t>
             </a:fld>
             <a:endParaRPr lang="en-CN"/>
           </a:p>
@@ -1825,7 +1830,7 @@
           <a:p>
             <a:fld id="{D09E5AC5-2EF2-5D48-869F-6D9756F06D66}" type="datetimeFigureOut">
               <a:rPr lang="en-CN" smtClean="0"/>
-              <a:t>2020/12/5</a:t>
+              <a:t>2020/12/11</a:t>
             </a:fld>
             <a:endParaRPr lang="en-CN"/>
           </a:p>
@@ -1967,7 +1972,7 @@
           <a:p>
             <a:fld id="{D09E5AC5-2EF2-5D48-869F-6D9756F06D66}" type="datetimeFigureOut">
               <a:rPr lang="en-CN" smtClean="0"/>
-              <a:t>2020/12/5</a:t>
+              <a:t>2020/12/11</a:t>
             </a:fld>
             <a:endParaRPr lang="en-CN"/>
           </a:p>
@@ -2080,7 +2085,7 @@
           <a:p>
             <a:fld id="{D09E5AC5-2EF2-5D48-869F-6D9756F06D66}" type="datetimeFigureOut">
               <a:rPr lang="en-CN" smtClean="0"/>
-              <a:t>2020/12/5</a:t>
+              <a:t>2020/12/11</a:t>
             </a:fld>
             <a:endParaRPr lang="en-CN"/>
           </a:p>
@@ -2393,7 +2398,7 @@
           <a:p>
             <a:fld id="{D09E5AC5-2EF2-5D48-869F-6D9756F06D66}" type="datetimeFigureOut">
               <a:rPr lang="en-CN" smtClean="0"/>
-              <a:t>2020/12/5</a:t>
+              <a:t>2020/12/11</a:t>
             </a:fld>
             <a:endParaRPr lang="en-CN"/>
           </a:p>
@@ -2682,7 +2687,7 @@
           <a:p>
             <a:fld id="{D09E5AC5-2EF2-5D48-869F-6D9756F06D66}" type="datetimeFigureOut">
               <a:rPr lang="en-CN" smtClean="0"/>
-              <a:t>2020/12/5</a:t>
+              <a:t>2020/12/11</a:t>
             </a:fld>
             <a:endParaRPr lang="en-CN"/>
           </a:p>
@@ -2925,7 +2930,7 @@
           <a:p>
             <a:fld id="{D09E5AC5-2EF2-5D48-869F-6D9756F06D66}" type="datetimeFigureOut">
               <a:rPr lang="en-CN" smtClean="0"/>
-              <a:t>2020/12/5</a:t>
+              <a:t>2020/12/11</a:t>
             </a:fld>
             <a:endParaRPr lang="en-CN"/>
           </a:p>
@@ -4165,127 +4170,6 @@
           </a:fontRef>
         </p:style>
       </p:cxnSp>
-      <p:cxnSp>
-        <p:nvCxnSpPr>
-          <p:cNvPr id="50" name="Straight Connector 49">
-            <a:extLst>
-              <a:ext uri="{FF2B5EF4-FFF2-40B4-BE49-F238E27FC236}">
-                <a16:creationId xmlns:a16="http://schemas.microsoft.com/office/drawing/2014/main" id="{3020B56E-81B3-A043-BA72-B349DAFF1B89}"/>
-              </a:ext>
-            </a:extLst>
-          </p:cNvPr>
-          <p:cNvCxnSpPr>
-            <a:cxnSpLocks/>
-          </p:cNvCxnSpPr>
-          <p:nvPr/>
-        </p:nvCxnSpPr>
-        <p:spPr>
-          <a:xfrm flipH="1" flipV="1">
-            <a:off x="7583215" y="1692903"/>
-            <a:ext cx="1502980" cy="409902"/>
-          </a:xfrm>
-          <a:prstGeom prst="line">
-            <a:avLst/>
-          </a:prstGeom>
-          <a:ln w="19050">
-            <a:prstDash val="dashDot"/>
-          </a:ln>
-        </p:spPr>
-        <p:style>
-          <a:lnRef idx="2">
-            <a:schemeClr val="dk1"/>
-          </a:lnRef>
-          <a:fillRef idx="0">
-            <a:schemeClr val="dk1"/>
-          </a:fillRef>
-          <a:effectRef idx="1">
-            <a:schemeClr val="dk1"/>
-          </a:effectRef>
-          <a:fontRef idx="minor">
-            <a:schemeClr val="tx1"/>
-          </a:fontRef>
-        </p:style>
-      </p:cxnSp>
-      <p:cxnSp>
-        <p:nvCxnSpPr>
-          <p:cNvPr id="51" name="Straight Connector 50">
-            <a:extLst>
-              <a:ext uri="{FF2B5EF4-FFF2-40B4-BE49-F238E27FC236}">
-                <a16:creationId xmlns:a16="http://schemas.microsoft.com/office/drawing/2014/main" id="{831CD43F-7253-5842-B918-E7DC014ADC8C}"/>
-              </a:ext>
-            </a:extLst>
-          </p:cNvPr>
-          <p:cNvCxnSpPr>
-            <a:cxnSpLocks/>
-          </p:cNvCxnSpPr>
-          <p:nvPr/>
-        </p:nvCxnSpPr>
-        <p:spPr>
-          <a:xfrm>
-            <a:off x="9086195" y="2102805"/>
-            <a:ext cx="536027" cy="152400"/>
-          </a:xfrm>
-          <a:prstGeom prst="line">
-            <a:avLst/>
-          </a:prstGeom>
-          <a:ln w="19050"/>
-        </p:spPr>
-        <p:style>
-          <a:lnRef idx="2">
-            <a:schemeClr val="dk1"/>
-          </a:lnRef>
-          <a:fillRef idx="0">
-            <a:schemeClr val="dk1"/>
-          </a:fillRef>
-          <a:effectRef idx="1">
-            <a:schemeClr val="dk1"/>
-          </a:effectRef>
-          <a:fontRef idx="minor">
-            <a:schemeClr val="tx1"/>
-          </a:fontRef>
-        </p:style>
-      </p:cxnSp>
-      <p:cxnSp>
-        <p:nvCxnSpPr>
-          <p:cNvPr id="52" name="Straight Connector 51">
-            <a:extLst>
-              <a:ext uri="{FF2B5EF4-FFF2-40B4-BE49-F238E27FC236}">
-                <a16:creationId xmlns:a16="http://schemas.microsoft.com/office/drawing/2014/main" id="{58F5CA2C-ABAE-6F41-B921-452B0D0F4426}"/>
-              </a:ext>
-            </a:extLst>
-          </p:cNvPr>
-          <p:cNvCxnSpPr>
-            <a:cxnSpLocks/>
-          </p:cNvCxnSpPr>
-          <p:nvPr/>
-        </p:nvCxnSpPr>
-        <p:spPr>
-          <a:xfrm flipH="1" flipV="1">
-            <a:off x="6689835" y="1461675"/>
-            <a:ext cx="893380" cy="231229"/>
-          </a:xfrm>
-          <a:prstGeom prst="line">
-            <a:avLst/>
-          </a:prstGeom>
-          <a:ln w="19050">
-            <a:headEnd type="oval"/>
-          </a:ln>
-        </p:spPr>
-        <p:style>
-          <a:lnRef idx="2">
-            <a:schemeClr val="dk1"/>
-          </a:lnRef>
-          <a:fillRef idx="0">
-            <a:schemeClr val="dk1"/>
-          </a:fillRef>
-          <a:effectRef idx="1">
-            <a:schemeClr val="dk1"/>
-          </a:effectRef>
-          <a:fontRef idx="minor">
-            <a:schemeClr val="tx1"/>
-          </a:fontRef>
-        </p:style>
-      </p:cxnSp>
       <p:sp>
         <p:nvSpPr>
           <p:cNvPr id="54" name="TextBox 53">
@@ -4300,7 +4184,7 @@
         </p:nvSpPr>
         <p:spPr>
           <a:xfrm>
-            <a:off x="7583215" y="698208"/>
+            <a:off x="7498550" y="618640"/>
             <a:ext cx="301686" cy="369332"/>
           </a:xfrm>
           <a:prstGeom prst="rect">
@@ -4444,7 +4328,7 @@
         </p:nvSpPr>
         <p:spPr>
           <a:xfrm>
-            <a:off x="8047227" y="1524000"/>
+            <a:off x="7898861" y="1545757"/>
             <a:ext cx="336952" cy="369332"/>
           </a:xfrm>
           <a:prstGeom prst="rect">
@@ -4467,1229 +4351,6 @@
       </p:sp>
       <p:cxnSp>
         <p:nvCxnSpPr>
-          <p:cNvPr id="59" name="Straight Connector 58">
-            <a:extLst>
-              <a:ext uri="{FF2B5EF4-FFF2-40B4-BE49-F238E27FC236}">
-                <a16:creationId xmlns:a16="http://schemas.microsoft.com/office/drawing/2014/main" id="{4EE2B869-6046-9641-9B65-5A1DF879E9A0}"/>
-              </a:ext>
-            </a:extLst>
-          </p:cNvPr>
-          <p:cNvCxnSpPr>
-            <a:cxnSpLocks/>
-          </p:cNvCxnSpPr>
-          <p:nvPr/>
-        </p:nvCxnSpPr>
-        <p:spPr>
-          <a:xfrm>
-            <a:off x="3499943" y="3983417"/>
-            <a:ext cx="0" cy="1013516"/>
-          </a:xfrm>
-          <a:prstGeom prst="line">
-            <a:avLst/>
-          </a:prstGeom>
-          <a:ln w="19050">
-            <a:prstDash val="dash"/>
-          </a:ln>
-        </p:spPr>
-        <p:style>
-          <a:lnRef idx="2">
-            <a:schemeClr val="dk1"/>
-          </a:lnRef>
-          <a:fillRef idx="0">
-            <a:schemeClr val="dk1"/>
-          </a:fillRef>
-          <a:effectRef idx="1">
-            <a:schemeClr val="dk1"/>
-          </a:effectRef>
-          <a:fontRef idx="minor">
-            <a:schemeClr val="tx1"/>
-          </a:fontRef>
-        </p:style>
-      </p:cxnSp>
-      <p:cxnSp>
-        <p:nvCxnSpPr>
-          <p:cNvPr id="60" name="Straight Connector 59">
-            <a:extLst>
-              <a:ext uri="{FF2B5EF4-FFF2-40B4-BE49-F238E27FC236}">
-                <a16:creationId xmlns:a16="http://schemas.microsoft.com/office/drawing/2014/main" id="{FD46324D-1135-364F-8848-D6E806E6424A}"/>
-              </a:ext>
-            </a:extLst>
-          </p:cNvPr>
-          <p:cNvCxnSpPr>
-            <a:cxnSpLocks/>
-          </p:cNvCxnSpPr>
-          <p:nvPr/>
-        </p:nvCxnSpPr>
-        <p:spPr>
-          <a:xfrm flipH="1">
-            <a:off x="2469929" y="3983417"/>
-            <a:ext cx="1030015" cy="1513488"/>
-          </a:xfrm>
-          <a:prstGeom prst="line">
-            <a:avLst/>
-          </a:prstGeom>
-          <a:ln w="19050"/>
-        </p:spPr>
-        <p:style>
-          <a:lnRef idx="2">
-            <a:schemeClr val="dk1"/>
-          </a:lnRef>
-          <a:fillRef idx="0">
-            <a:schemeClr val="dk1"/>
-          </a:fillRef>
-          <a:effectRef idx="1">
-            <a:schemeClr val="dk1"/>
-          </a:effectRef>
-          <a:fontRef idx="minor">
-            <a:schemeClr val="tx1"/>
-          </a:fontRef>
-        </p:style>
-      </p:cxnSp>
-      <p:cxnSp>
-        <p:nvCxnSpPr>
-          <p:cNvPr id="61" name="Straight Connector 60">
-            <a:extLst>
-              <a:ext uri="{FF2B5EF4-FFF2-40B4-BE49-F238E27FC236}">
-                <a16:creationId xmlns:a16="http://schemas.microsoft.com/office/drawing/2014/main" id="{F2E65E99-17A6-404F-AFFC-7D3BDA38635A}"/>
-              </a:ext>
-            </a:extLst>
-          </p:cNvPr>
-          <p:cNvCxnSpPr>
-            <a:cxnSpLocks/>
-          </p:cNvCxnSpPr>
-          <p:nvPr/>
-        </p:nvCxnSpPr>
-        <p:spPr>
-          <a:xfrm flipH="1">
-            <a:off x="2508858" y="4983794"/>
-            <a:ext cx="991085" cy="504498"/>
-          </a:xfrm>
-          <a:prstGeom prst="line">
-            <a:avLst/>
-          </a:prstGeom>
-          <a:ln w="19050">
-            <a:prstDash val="dash"/>
-          </a:ln>
-        </p:spPr>
-        <p:style>
-          <a:lnRef idx="2">
-            <a:schemeClr val="dk1"/>
-          </a:lnRef>
-          <a:fillRef idx="0">
-            <a:schemeClr val="dk1"/>
-          </a:fillRef>
-          <a:effectRef idx="1">
-            <a:schemeClr val="dk1"/>
-          </a:effectRef>
-          <a:fontRef idx="minor">
-            <a:schemeClr val="tx1"/>
-          </a:fontRef>
-        </p:style>
-      </p:cxnSp>
-      <p:cxnSp>
-        <p:nvCxnSpPr>
-          <p:cNvPr id="62" name="Straight Connector 61">
-            <a:extLst>
-              <a:ext uri="{FF2B5EF4-FFF2-40B4-BE49-F238E27FC236}">
-                <a16:creationId xmlns:a16="http://schemas.microsoft.com/office/drawing/2014/main" id="{C0A0A535-BBAC-1840-9950-2D38A1A34947}"/>
-              </a:ext>
-            </a:extLst>
-          </p:cNvPr>
-          <p:cNvCxnSpPr>
-            <a:cxnSpLocks/>
-          </p:cNvCxnSpPr>
-          <p:nvPr/>
-        </p:nvCxnSpPr>
-        <p:spPr>
-          <a:xfrm flipH="1" flipV="1">
-            <a:off x="3499944" y="4996934"/>
-            <a:ext cx="1497723" cy="448943"/>
-          </a:xfrm>
-          <a:prstGeom prst="line">
-            <a:avLst/>
-          </a:prstGeom>
-          <a:ln w="19050">
-            <a:prstDash val="dash"/>
-          </a:ln>
-        </p:spPr>
-        <p:style>
-          <a:lnRef idx="2">
-            <a:schemeClr val="dk1"/>
-          </a:lnRef>
-          <a:fillRef idx="0">
-            <a:schemeClr val="dk1"/>
-          </a:fillRef>
-          <a:effectRef idx="1">
-            <a:schemeClr val="dk1"/>
-          </a:effectRef>
-          <a:fontRef idx="minor">
-            <a:schemeClr val="tx1"/>
-          </a:fontRef>
-        </p:style>
-      </p:cxnSp>
-      <p:cxnSp>
-        <p:nvCxnSpPr>
-          <p:cNvPr id="63" name="Straight Connector 62">
-            <a:extLst>
-              <a:ext uri="{FF2B5EF4-FFF2-40B4-BE49-F238E27FC236}">
-                <a16:creationId xmlns:a16="http://schemas.microsoft.com/office/drawing/2014/main" id="{2137C39F-30C7-ED42-A04A-DD645D7954CF}"/>
-              </a:ext>
-            </a:extLst>
-          </p:cNvPr>
-          <p:cNvCxnSpPr>
-            <a:cxnSpLocks/>
-          </p:cNvCxnSpPr>
-          <p:nvPr/>
-        </p:nvCxnSpPr>
-        <p:spPr>
-          <a:xfrm flipH="1" flipV="1">
-            <a:off x="3499944" y="3983418"/>
-            <a:ext cx="1510374" cy="1483850"/>
-          </a:xfrm>
-          <a:prstGeom prst="line">
-            <a:avLst/>
-          </a:prstGeom>
-          <a:ln w="19050"/>
-        </p:spPr>
-        <p:style>
-          <a:lnRef idx="2">
-            <a:schemeClr val="dk1"/>
-          </a:lnRef>
-          <a:fillRef idx="0">
-            <a:schemeClr val="dk1"/>
-          </a:fillRef>
-          <a:effectRef idx="1">
-            <a:schemeClr val="dk1"/>
-          </a:effectRef>
-          <a:fontRef idx="minor">
-            <a:schemeClr val="tx1"/>
-          </a:fontRef>
-        </p:style>
-      </p:cxnSp>
-      <p:cxnSp>
-        <p:nvCxnSpPr>
-          <p:cNvPr id="64" name="Straight Connector 63">
-            <a:extLst>
-              <a:ext uri="{FF2B5EF4-FFF2-40B4-BE49-F238E27FC236}">
-                <a16:creationId xmlns:a16="http://schemas.microsoft.com/office/drawing/2014/main" id="{D2B5410A-29A0-A044-91EB-80D0F38FB59B}"/>
-              </a:ext>
-            </a:extLst>
-          </p:cNvPr>
-          <p:cNvCxnSpPr>
-            <a:cxnSpLocks/>
-          </p:cNvCxnSpPr>
-          <p:nvPr/>
-        </p:nvCxnSpPr>
-        <p:spPr>
-          <a:xfrm flipH="1">
-            <a:off x="2469929" y="5466901"/>
-            <a:ext cx="2527738" cy="21391"/>
-          </a:xfrm>
-          <a:prstGeom prst="line">
-            <a:avLst/>
-          </a:prstGeom>
-          <a:ln w="19050">
-            <a:prstDash val="solid"/>
-          </a:ln>
-        </p:spPr>
-        <p:style>
-          <a:lnRef idx="2">
-            <a:schemeClr val="dk1"/>
-          </a:lnRef>
-          <a:fillRef idx="0">
-            <a:schemeClr val="dk1"/>
-          </a:fillRef>
-          <a:effectRef idx="1">
-            <a:schemeClr val="dk1"/>
-          </a:effectRef>
-          <a:fontRef idx="minor">
-            <a:schemeClr val="tx1"/>
-          </a:fontRef>
-        </p:style>
-      </p:cxnSp>
-      <p:cxnSp>
-        <p:nvCxnSpPr>
-          <p:cNvPr id="65" name="Straight Connector 64">
-            <a:extLst>
-              <a:ext uri="{FF2B5EF4-FFF2-40B4-BE49-F238E27FC236}">
-                <a16:creationId xmlns:a16="http://schemas.microsoft.com/office/drawing/2014/main" id="{1286FD1B-8333-0B44-8D67-67CF9596691E}"/>
-              </a:ext>
-            </a:extLst>
-          </p:cNvPr>
-          <p:cNvCxnSpPr>
-            <a:cxnSpLocks/>
-          </p:cNvCxnSpPr>
-          <p:nvPr/>
-        </p:nvCxnSpPr>
-        <p:spPr>
-          <a:xfrm flipV="1">
-            <a:off x="2496207" y="4694393"/>
-            <a:ext cx="1327943" cy="782653"/>
-          </a:xfrm>
-          <a:prstGeom prst="line">
-            <a:avLst/>
-          </a:prstGeom>
-          <a:ln w="19050">
-            <a:prstDash val="dashDot"/>
-          </a:ln>
-        </p:spPr>
-        <p:style>
-          <a:lnRef idx="2">
-            <a:schemeClr val="dk1"/>
-          </a:lnRef>
-          <a:fillRef idx="0">
-            <a:schemeClr val="dk1"/>
-          </a:fillRef>
-          <a:effectRef idx="1">
-            <a:schemeClr val="dk1"/>
-          </a:effectRef>
-          <a:fontRef idx="minor">
-            <a:schemeClr val="tx1"/>
-          </a:fontRef>
-        </p:style>
-      </p:cxnSp>
-      <p:cxnSp>
-        <p:nvCxnSpPr>
-          <p:cNvPr id="66" name="Straight Connector 65">
-            <a:extLst>
-              <a:ext uri="{FF2B5EF4-FFF2-40B4-BE49-F238E27FC236}">
-                <a16:creationId xmlns:a16="http://schemas.microsoft.com/office/drawing/2014/main" id="{BDBFFFC4-7987-D644-BEB9-B3509947B002}"/>
-              </a:ext>
-            </a:extLst>
-          </p:cNvPr>
-          <p:cNvCxnSpPr>
-            <a:cxnSpLocks/>
-          </p:cNvCxnSpPr>
-          <p:nvPr/>
-        </p:nvCxnSpPr>
-        <p:spPr>
-          <a:xfrm flipV="1">
-            <a:off x="1939714" y="5486026"/>
-            <a:ext cx="530215" cy="313419"/>
-          </a:xfrm>
-          <a:prstGeom prst="line">
-            <a:avLst/>
-          </a:prstGeom>
-          <a:ln w="19050"/>
-        </p:spPr>
-        <p:style>
-          <a:lnRef idx="2">
-            <a:schemeClr val="dk1"/>
-          </a:lnRef>
-          <a:fillRef idx="0">
-            <a:schemeClr val="dk1"/>
-          </a:fillRef>
-          <a:effectRef idx="1">
-            <a:schemeClr val="dk1"/>
-          </a:effectRef>
-          <a:fontRef idx="minor">
-            <a:schemeClr val="tx1"/>
-          </a:fontRef>
-        </p:style>
-      </p:cxnSp>
-      <p:cxnSp>
-        <p:nvCxnSpPr>
-          <p:cNvPr id="67" name="Straight Connector 66">
-            <a:extLst>
-              <a:ext uri="{FF2B5EF4-FFF2-40B4-BE49-F238E27FC236}">
-                <a16:creationId xmlns:a16="http://schemas.microsoft.com/office/drawing/2014/main" id="{17429BD7-C993-E242-9002-9B184610AAFA}"/>
-              </a:ext>
-            </a:extLst>
-          </p:cNvPr>
-          <p:cNvCxnSpPr>
-            <a:cxnSpLocks/>
-          </p:cNvCxnSpPr>
-          <p:nvPr/>
-        </p:nvCxnSpPr>
-        <p:spPr>
-          <a:xfrm flipV="1">
-            <a:off x="4048660" y="4125311"/>
-            <a:ext cx="762197" cy="440700"/>
-          </a:xfrm>
-          <a:prstGeom prst="line">
-            <a:avLst/>
-          </a:prstGeom>
-          <a:ln w="19050">
-            <a:headEnd type="none" w="med" len="med"/>
-            <a:tailEnd type="none" w="med" len="med"/>
-          </a:ln>
-        </p:spPr>
-        <p:style>
-          <a:lnRef idx="2">
-            <a:schemeClr val="dk1"/>
-          </a:lnRef>
-          <a:fillRef idx="0">
-            <a:schemeClr val="dk1"/>
-          </a:fillRef>
-          <a:effectRef idx="1">
-            <a:schemeClr val="dk1"/>
-          </a:effectRef>
-          <a:fontRef idx="minor">
-            <a:schemeClr val="tx1"/>
-          </a:fontRef>
-        </p:style>
-      </p:cxnSp>
-      <p:sp>
-        <p:nvSpPr>
-          <p:cNvPr id="68" name="Arc 67">
-            <a:extLst>
-              <a:ext uri="{FF2B5EF4-FFF2-40B4-BE49-F238E27FC236}">
-                <a16:creationId xmlns:a16="http://schemas.microsoft.com/office/drawing/2014/main" id="{77216C56-27C8-7544-87DD-4955CC217913}"/>
-              </a:ext>
-            </a:extLst>
-          </p:cNvPr>
-          <p:cNvSpPr/>
-          <p:nvPr/>
-        </p:nvSpPr>
-        <p:spPr>
-          <a:xfrm>
-            <a:off x="3953908" y="3846781"/>
-            <a:ext cx="735725" cy="714703"/>
-          </a:xfrm>
-          <a:prstGeom prst="arc">
-            <a:avLst>
-              <a:gd name="adj1" fmla="val 18956081"/>
-              <a:gd name="adj2" fmla="val 4046261"/>
-            </a:avLst>
-          </a:prstGeom>
-          <a:ln>
-            <a:headEnd type="arrow" w="med" len="med"/>
-            <a:tailEnd type="none" w="med" len="med"/>
-          </a:ln>
-        </p:spPr>
-        <p:style>
-          <a:lnRef idx="3">
-            <a:schemeClr val="dk1"/>
-          </a:lnRef>
-          <a:fillRef idx="0">
-            <a:schemeClr val="dk1"/>
-          </a:fillRef>
-          <a:effectRef idx="2">
-            <a:schemeClr val="dk1"/>
-          </a:effectRef>
-          <a:fontRef idx="minor">
-            <a:schemeClr val="tx1"/>
-          </a:fontRef>
-        </p:style>
-        <p:txBody>
-          <a:bodyPr rtlCol="0" anchor="ctr"/>
-          <a:lstStyle/>
-          <a:p>
-            <a:pPr algn="ctr"/>
-            <a:endParaRPr lang="en-CN"/>
-          </a:p>
-        </p:txBody>
-      </p:sp>
-      <p:sp>
-        <p:nvSpPr>
-          <p:cNvPr id="69" name="TextBox 68">
-            <a:extLst>
-              <a:ext uri="{FF2B5EF4-FFF2-40B4-BE49-F238E27FC236}">
-                <a16:creationId xmlns:a16="http://schemas.microsoft.com/office/drawing/2014/main" id="{E334283B-290E-AE40-B482-A3C06A31B79F}"/>
-              </a:ext>
-            </a:extLst>
-          </p:cNvPr>
-          <p:cNvSpPr txBox="1"/>
-          <p:nvPr/>
-        </p:nvSpPr>
-        <p:spPr>
-          <a:xfrm>
-            <a:off x="3235163" y="3607515"/>
-            <a:ext cx="301686" cy="369332"/>
-          </a:xfrm>
-          <a:prstGeom prst="rect">
-            <a:avLst/>
-          </a:prstGeom>
-          <a:noFill/>
-        </p:spPr>
-        <p:txBody>
-          <a:bodyPr wrap="none" rtlCol="0">
-            <a:spAutoFit/>
-          </a:bodyPr>
-          <a:lstStyle/>
-          <a:p>
-            <a:r>
-              <a:rPr lang="en-US" altLang="zh-CN" dirty="0"/>
-              <a:t>3</a:t>
-            </a:r>
-            <a:endParaRPr lang="en-CN" dirty="0"/>
-          </a:p>
-        </p:txBody>
-      </p:sp>
-      <p:sp>
-        <p:nvSpPr>
-          <p:cNvPr id="70" name="TextBox 69">
-            <a:extLst>
-              <a:ext uri="{FF2B5EF4-FFF2-40B4-BE49-F238E27FC236}">
-                <a16:creationId xmlns:a16="http://schemas.microsoft.com/office/drawing/2014/main" id="{97DB1243-803F-3643-BBE8-3A296A4BD601}"/>
-              </a:ext>
-            </a:extLst>
-          </p:cNvPr>
-          <p:cNvSpPr txBox="1"/>
-          <p:nvPr/>
-        </p:nvSpPr>
-        <p:spPr>
-          <a:xfrm>
-            <a:off x="2175057" y="5127574"/>
-            <a:ext cx="301686" cy="369332"/>
-          </a:xfrm>
-          <a:prstGeom prst="rect">
-            <a:avLst/>
-          </a:prstGeom>
-          <a:noFill/>
-        </p:spPr>
-        <p:txBody>
-          <a:bodyPr wrap="none" rtlCol="0">
-            <a:spAutoFit/>
-          </a:bodyPr>
-          <a:lstStyle/>
-          <a:p>
-            <a:r>
-              <a:rPr lang="en-US" altLang="zh-CN" dirty="0"/>
-              <a:t>4</a:t>
-            </a:r>
-            <a:endParaRPr lang="en-CN" dirty="0"/>
-          </a:p>
-        </p:txBody>
-      </p:sp>
-      <p:sp>
-        <p:nvSpPr>
-          <p:cNvPr id="71" name="TextBox 70">
-            <a:extLst>
-              <a:ext uri="{FF2B5EF4-FFF2-40B4-BE49-F238E27FC236}">
-                <a16:creationId xmlns:a16="http://schemas.microsoft.com/office/drawing/2014/main" id="{B194AFD5-89A8-B448-8C30-5E2580B4EFC2}"/>
-              </a:ext>
-            </a:extLst>
-          </p:cNvPr>
-          <p:cNvSpPr txBox="1"/>
-          <p:nvPr/>
-        </p:nvSpPr>
-        <p:spPr>
-          <a:xfrm>
-            <a:off x="3326642" y="5026994"/>
-            <a:ext cx="301686" cy="369332"/>
-          </a:xfrm>
-          <a:prstGeom prst="rect">
-            <a:avLst/>
-          </a:prstGeom>
-          <a:noFill/>
-        </p:spPr>
-        <p:txBody>
-          <a:bodyPr wrap="none" rtlCol="0">
-            <a:spAutoFit/>
-          </a:bodyPr>
-          <a:lstStyle/>
-          <a:p>
-            <a:r>
-              <a:rPr lang="en-US" altLang="zh-CN" dirty="0"/>
-              <a:t>1</a:t>
-            </a:r>
-            <a:endParaRPr lang="en-CN" dirty="0"/>
-          </a:p>
-        </p:txBody>
-      </p:sp>
-      <p:sp>
-        <p:nvSpPr>
-          <p:cNvPr id="72" name="TextBox 71">
-            <a:extLst>
-              <a:ext uri="{FF2B5EF4-FFF2-40B4-BE49-F238E27FC236}">
-                <a16:creationId xmlns:a16="http://schemas.microsoft.com/office/drawing/2014/main" id="{6B36944D-0617-A847-B730-EB33480D653C}"/>
-              </a:ext>
-            </a:extLst>
-          </p:cNvPr>
-          <p:cNvSpPr txBox="1"/>
-          <p:nvPr/>
-        </p:nvSpPr>
-        <p:spPr>
-          <a:xfrm>
-            <a:off x="4912029" y="5480038"/>
-            <a:ext cx="301686" cy="369332"/>
-          </a:xfrm>
-          <a:prstGeom prst="rect">
-            <a:avLst/>
-          </a:prstGeom>
-          <a:noFill/>
-        </p:spPr>
-        <p:txBody>
-          <a:bodyPr wrap="none" rtlCol="0">
-            <a:spAutoFit/>
-          </a:bodyPr>
-          <a:lstStyle/>
-          <a:p>
-            <a:r>
-              <a:rPr lang="en-US" altLang="zh-CN" dirty="0"/>
-              <a:t>2</a:t>
-            </a:r>
-            <a:endParaRPr lang="en-CN" dirty="0"/>
-          </a:p>
-        </p:txBody>
-      </p:sp>
-      <p:sp>
-        <p:nvSpPr>
-          <p:cNvPr id="73" name="TextBox 72">
-            <a:extLst>
-              <a:ext uri="{FF2B5EF4-FFF2-40B4-BE49-F238E27FC236}">
-                <a16:creationId xmlns:a16="http://schemas.microsoft.com/office/drawing/2014/main" id="{51739986-ECEA-A843-A1DA-D4BF12D2791B}"/>
-              </a:ext>
-            </a:extLst>
-          </p:cNvPr>
-          <p:cNvSpPr txBox="1"/>
-          <p:nvPr/>
-        </p:nvSpPr>
-        <p:spPr>
-          <a:xfrm>
-            <a:off x="3708144" y="4740161"/>
-            <a:ext cx="336952" cy="369332"/>
-          </a:xfrm>
-          <a:prstGeom prst="rect">
-            <a:avLst/>
-          </a:prstGeom>
-          <a:noFill/>
-        </p:spPr>
-        <p:txBody>
-          <a:bodyPr wrap="none" rtlCol="0">
-            <a:spAutoFit/>
-          </a:bodyPr>
-          <a:lstStyle/>
-          <a:p>
-            <a:r>
-              <a:rPr lang="en-CN" dirty="0"/>
-              <a:t>O</a:t>
-            </a:r>
-          </a:p>
-        </p:txBody>
-      </p:sp>
-      <p:cxnSp>
-        <p:nvCxnSpPr>
-          <p:cNvPr id="94" name="Straight Connector 93">
-            <a:extLst>
-              <a:ext uri="{FF2B5EF4-FFF2-40B4-BE49-F238E27FC236}">
-                <a16:creationId xmlns:a16="http://schemas.microsoft.com/office/drawing/2014/main" id="{52394D7F-84BC-7F47-B1A6-85A098570A89}"/>
-              </a:ext>
-            </a:extLst>
-          </p:cNvPr>
-          <p:cNvCxnSpPr>
-            <a:cxnSpLocks/>
-          </p:cNvCxnSpPr>
-          <p:nvPr/>
-        </p:nvCxnSpPr>
-        <p:spPr>
-          <a:xfrm flipH="1">
-            <a:off x="3824150" y="4571996"/>
-            <a:ext cx="224510" cy="117695"/>
-          </a:xfrm>
-          <a:prstGeom prst="line">
-            <a:avLst/>
-          </a:prstGeom>
-          <a:ln w="19050">
-            <a:prstDash val="dashDot"/>
-            <a:headEnd type="none"/>
-            <a:tailEnd type="oval"/>
-          </a:ln>
-        </p:spPr>
-        <p:style>
-          <a:lnRef idx="2">
-            <a:schemeClr val="dk1"/>
-          </a:lnRef>
-          <a:fillRef idx="0">
-            <a:schemeClr val="dk1"/>
-          </a:fillRef>
-          <a:effectRef idx="1">
-            <a:schemeClr val="dk1"/>
-          </a:effectRef>
-          <a:fontRef idx="minor">
-            <a:schemeClr val="tx1"/>
-          </a:fontRef>
-        </p:style>
-      </p:cxnSp>
-      <p:cxnSp>
-        <p:nvCxnSpPr>
-          <p:cNvPr id="102" name="Straight Connector 101">
-            <a:extLst>
-              <a:ext uri="{FF2B5EF4-FFF2-40B4-BE49-F238E27FC236}">
-                <a16:creationId xmlns:a16="http://schemas.microsoft.com/office/drawing/2014/main" id="{8E919496-1878-6C49-9327-72D899C6233C}"/>
-              </a:ext>
-            </a:extLst>
-          </p:cNvPr>
-          <p:cNvCxnSpPr>
-            <a:cxnSpLocks/>
-          </p:cNvCxnSpPr>
-          <p:nvPr/>
-        </p:nvCxnSpPr>
-        <p:spPr>
-          <a:xfrm>
-            <a:off x="8003652" y="3904329"/>
-            <a:ext cx="0" cy="1013516"/>
-          </a:xfrm>
-          <a:prstGeom prst="line">
-            <a:avLst/>
-          </a:prstGeom>
-          <a:ln w="19050">
-            <a:prstDash val="dash"/>
-          </a:ln>
-        </p:spPr>
-        <p:style>
-          <a:lnRef idx="2">
-            <a:schemeClr val="dk1"/>
-          </a:lnRef>
-          <a:fillRef idx="0">
-            <a:schemeClr val="dk1"/>
-          </a:fillRef>
-          <a:effectRef idx="1">
-            <a:schemeClr val="dk1"/>
-          </a:effectRef>
-          <a:fontRef idx="minor">
-            <a:schemeClr val="tx1"/>
-          </a:fontRef>
-        </p:style>
-      </p:cxnSp>
-      <p:cxnSp>
-        <p:nvCxnSpPr>
-          <p:cNvPr id="103" name="Straight Connector 102">
-            <a:extLst>
-              <a:ext uri="{FF2B5EF4-FFF2-40B4-BE49-F238E27FC236}">
-                <a16:creationId xmlns:a16="http://schemas.microsoft.com/office/drawing/2014/main" id="{1E0A3A08-1AEA-2247-9DB4-35FED6AC1FC7}"/>
-              </a:ext>
-            </a:extLst>
-          </p:cNvPr>
-          <p:cNvCxnSpPr>
-            <a:cxnSpLocks/>
-          </p:cNvCxnSpPr>
-          <p:nvPr/>
-        </p:nvCxnSpPr>
-        <p:spPr>
-          <a:xfrm flipH="1">
-            <a:off x="6973638" y="3904329"/>
-            <a:ext cx="1030015" cy="1513488"/>
-          </a:xfrm>
-          <a:prstGeom prst="line">
-            <a:avLst/>
-          </a:prstGeom>
-          <a:ln w="19050"/>
-        </p:spPr>
-        <p:style>
-          <a:lnRef idx="2">
-            <a:schemeClr val="dk1"/>
-          </a:lnRef>
-          <a:fillRef idx="0">
-            <a:schemeClr val="dk1"/>
-          </a:fillRef>
-          <a:effectRef idx="1">
-            <a:schemeClr val="dk1"/>
-          </a:effectRef>
-          <a:fontRef idx="minor">
-            <a:schemeClr val="tx1"/>
-          </a:fontRef>
-        </p:style>
-      </p:cxnSp>
-      <p:cxnSp>
-        <p:nvCxnSpPr>
-          <p:cNvPr id="104" name="Straight Connector 103">
-            <a:extLst>
-              <a:ext uri="{FF2B5EF4-FFF2-40B4-BE49-F238E27FC236}">
-                <a16:creationId xmlns:a16="http://schemas.microsoft.com/office/drawing/2014/main" id="{47C3AE0C-F6CF-4741-AF37-ECC2CD68B92D}"/>
-              </a:ext>
-            </a:extLst>
-          </p:cNvPr>
-          <p:cNvCxnSpPr>
-            <a:cxnSpLocks/>
-          </p:cNvCxnSpPr>
-          <p:nvPr/>
-        </p:nvCxnSpPr>
-        <p:spPr>
-          <a:xfrm flipH="1">
-            <a:off x="7012567" y="4904706"/>
-            <a:ext cx="991085" cy="504498"/>
-          </a:xfrm>
-          <a:prstGeom prst="line">
-            <a:avLst/>
-          </a:prstGeom>
-          <a:ln w="19050">
-            <a:prstDash val="dash"/>
-          </a:ln>
-        </p:spPr>
-        <p:style>
-          <a:lnRef idx="2">
-            <a:schemeClr val="dk1"/>
-          </a:lnRef>
-          <a:fillRef idx="0">
-            <a:schemeClr val="dk1"/>
-          </a:fillRef>
-          <a:effectRef idx="1">
-            <a:schemeClr val="dk1"/>
-          </a:effectRef>
-          <a:fontRef idx="minor">
-            <a:schemeClr val="tx1"/>
-          </a:fontRef>
-        </p:style>
-      </p:cxnSp>
-      <p:cxnSp>
-        <p:nvCxnSpPr>
-          <p:cNvPr id="105" name="Straight Connector 104">
-            <a:extLst>
-              <a:ext uri="{FF2B5EF4-FFF2-40B4-BE49-F238E27FC236}">
-                <a16:creationId xmlns:a16="http://schemas.microsoft.com/office/drawing/2014/main" id="{5C72FD98-E1C9-074E-A379-3B18281FD244}"/>
-              </a:ext>
-            </a:extLst>
-          </p:cNvPr>
-          <p:cNvCxnSpPr>
-            <a:cxnSpLocks/>
-          </p:cNvCxnSpPr>
-          <p:nvPr/>
-        </p:nvCxnSpPr>
-        <p:spPr>
-          <a:xfrm flipH="1" flipV="1">
-            <a:off x="8003653" y="4917846"/>
-            <a:ext cx="1497723" cy="448943"/>
-          </a:xfrm>
-          <a:prstGeom prst="line">
-            <a:avLst/>
-          </a:prstGeom>
-          <a:ln w="19050">
-            <a:prstDash val="dash"/>
-          </a:ln>
-        </p:spPr>
-        <p:style>
-          <a:lnRef idx="2">
-            <a:schemeClr val="dk1"/>
-          </a:lnRef>
-          <a:fillRef idx="0">
-            <a:schemeClr val="dk1"/>
-          </a:fillRef>
-          <a:effectRef idx="1">
-            <a:schemeClr val="dk1"/>
-          </a:effectRef>
-          <a:fontRef idx="minor">
-            <a:schemeClr val="tx1"/>
-          </a:fontRef>
-        </p:style>
-      </p:cxnSp>
-      <p:cxnSp>
-        <p:nvCxnSpPr>
-          <p:cNvPr id="106" name="Straight Connector 105">
-            <a:extLst>
-              <a:ext uri="{FF2B5EF4-FFF2-40B4-BE49-F238E27FC236}">
-                <a16:creationId xmlns:a16="http://schemas.microsoft.com/office/drawing/2014/main" id="{58B397C1-74AE-0044-B16D-088408C154E8}"/>
-              </a:ext>
-            </a:extLst>
-          </p:cNvPr>
-          <p:cNvCxnSpPr>
-            <a:cxnSpLocks/>
-          </p:cNvCxnSpPr>
-          <p:nvPr/>
-        </p:nvCxnSpPr>
-        <p:spPr>
-          <a:xfrm flipH="1" flipV="1">
-            <a:off x="8003653" y="3904330"/>
-            <a:ext cx="1510374" cy="1483850"/>
-          </a:xfrm>
-          <a:prstGeom prst="line">
-            <a:avLst/>
-          </a:prstGeom>
-          <a:ln w="19050"/>
-        </p:spPr>
-        <p:style>
-          <a:lnRef idx="2">
-            <a:schemeClr val="dk1"/>
-          </a:lnRef>
-          <a:fillRef idx="0">
-            <a:schemeClr val="dk1"/>
-          </a:fillRef>
-          <a:effectRef idx="1">
-            <a:schemeClr val="dk1"/>
-          </a:effectRef>
-          <a:fontRef idx="minor">
-            <a:schemeClr val="tx1"/>
-          </a:fontRef>
-        </p:style>
-      </p:cxnSp>
-      <p:cxnSp>
-        <p:nvCxnSpPr>
-          <p:cNvPr id="107" name="Straight Connector 106">
-            <a:extLst>
-              <a:ext uri="{FF2B5EF4-FFF2-40B4-BE49-F238E27FC236}">
-                <a16:creationId xmlns:a16="http://schemas.microsoft.com/office/drawing/2014/main" id="{D2A37103-1C18-2E4A-A80F-CA17519D782C}"/>
-              </a:ext>
-            </a:extLst>
-          </p:cNvPr>
-          <p:cNvCxnSpPr>
-            <a:cxnSpLocks/>
-          </p:cNvCxnSpPr>
-          <p:nvPr/>
-        </p:nvCxnSpPr>
-        <p:spPr>
-          <a:xfrm flipH="1">
-            <a:off x="6973638" y="5387813"/>
-            <a:ext cx="2527738" cy="21391"/>
-          </a:xfrm>
-          <a:prstGeom prst="line">
-            <a:avLst/>
-          </a:prstGeom>
-          <a:ln w="19050">
-            <a:prstDash val="solid"/>
-          </a:ln>
-        </p:spPr>
-        <p:style>
-          <a:lnRef idx="2">
-            <a:schemeClr val="dk1"/>
-          </a:lnRef>
-          <a:fillRef idx="0">
-            <a:schemeClr val="dk1"/>
-          </a:fillRef>
-          <a:effectRef idx="1">
-            <a:schemeClr val="dk1"/>
-          </a:effectRef>
-          <a:fontRef idx="minor">
-            <a:schemeClr val="tx1"/>
-          </a:fontRef>
-        </p:style>
-      </p:cxnSp>
-      <p:cxnSp>
-        <p:nvCxnSpPr>
-          <p:cNvPr id="108" name="Straight Connector 107">
-            <a:extLst>
-              <a:ext uri="{FF2B5EF4-FFF2-40B4-BE49-F238E27FC236}">
-                <a16:creationId xmlns:a16="http://schemas.microsoft.com/office/drawing/2014/main" id="{C994A2F3-8F07-8E4C-996E-1B6276785B85}"/>
-              </a:ext>
-            </a:extLst>
-          </p:cNvPr>
-          <p:cNvCxnSpPr>
-            <a:cxnSpLocks/>
-          </p:cNvCxnSpPr>
-          <p:nvPr/>
-        </p:nvCxnSpPr>
-        <p:spPr>
-          <a:xfrm flipV="1">
-            <a:off x="6999916" y="4615305"/>
-            <a:ext cx="1327943" cy="782653"/>
-          </a:xfrm>
-          <a:prstGeom prst="line">
-            <a:avLst/>
-          </a:prstGeom>
-          <a:ln w="19050">
-            <a:prstDash val="dashDot"/>
-          </a:ln>
-        </p:spPr>
-        <p:style>
-          <a:lnRef idx="2">
-            <a:schemeClr val="dk1"/>
-          </a:lnRef>
-          <a:fillRef idx="0">
-            <a:schemeClr val="dk1"/>
-          </a:fillRef>
-          <a:effectRef idx="1">
-            <a:schemeClr val="dk1"/>
-          </a:effectRef>
-          <a:fontRef idx="minor">
-            <a:schemeClr val="tx1"/>
-          </a:fontRef>
-        </p:style>
-      </p:cxnSp>
-      <p:cxnSp>
-        <p:nvCxnSpPr>
-          <p:cNvPr id="109" name="Straight Connector 108">
-            <a:extLst>
-              <a:ext uri="{FF2B5EF4-FFF2-40B4-BE49-F238E27FC236}">
-                <a16:creationId xmlns:a16="http://schemas.microsoft.com/office/drawing/2014/main" id="{3FA23222-BA63-CA4D-BC0C-6CCE79C2397F}"/>
-              </a:ext>
-            </a:extLst>
-          </p:cNvPr>
-          <p:cNvCxnSpPr>
-            <a:cxnSpLocks/>
-          </p:cNvCxnSpPr>
-          <p:nvPr/>
-        </p:nvCxnSpPr>
-        <p:spPr>
-          <a:xfrm flipV="1">
-            <a:off x="6443423" y="5406938"/>
-            <a:ext cx="530215" cy="313419"/>
-          </a:xfrm>
-          <a:prstGeom prst="line">
-            <a:avLst/>
-          </a:prstGeom>
-          <a:ln w="19050"/>
-        </p:spPr>
-        <p:style>
-          <a:lnRef idx="2">
-            <a:schemeClr val="dk1"/>
-          </a:lnRef>
-          <a:fillRef idx="0">
-            <a:schemeClr val="dk1"/>
-          </a:fillRef>
-          <a:effectRef idx="1">
-            <a:schemeClr val="dk1"/>
-          </a:effectRef>
-          <a:fontRef idx="minor">
-            <a:schemeClr val="tx1"/>
-          </a:fontRef>
-        </p:style>
-      </p:cxnSp>
-      <p:cxnSp>
-        <p:nvCxnSpPr>
-          <p:cNvPr id="110" name="Straight Connector 109">
-            <a:extLst>
-              <a:ext uri="{FF2B5EF4-FFF2-40B4-BE49-F238E27FC236}">
-                <a16:creationId xmlns:a16="http://schemas.microsoft.com/office/drawing/2014/main" id="{FC9A90E6-F555-4F4B-872B-7B12A8D2C9D3}"/>
-              </a:ext>
-            </a:extLst>
-          </p:cNvPr>
-          <p:cNvCxnSpPr>
-            <a:cxnSpLocks/>
-          </p:cNvCxnSpPr>
-          <p:nvPr/>
-        </p:nvCxnSpPr>
-        <p:spPr>
-          <a:xfrm flipV="1">
-            <a:off x="8552369" y="4046223"/>
-            <a:ext cx="762197" cy="440700"/>
-          </a:xfrm>
-          <a:prstGeom prst="line">
-            <a:avLst/>
-          </a:prstGeom>
-          <a:ln w="19050">
-            <a:headEnd type="none" w="med" len="med"/>
-            <a:tailEnd type="none" w="med" len="med"/>
-          </a:ln>
-        </p:spPr>
-        <p:style>
-          <a:lnRef idx="2">
-            <a:schemeClr val="dk1"/>
-          </a:lnRef>
-          <a:fillRef idx="0">
-            <a:schemeClr val="dk1"/>
-          </a:fillRef>
-          <a:effectRef idx="1">
-            <a:schemeClr val="dk1"/>
-          </a:effectRef>
-          <a:fontRef idx="minor">
-            <a:schemeClr val="tx1"/>
-          </a:fontRef>
-        </p:style>
-      </p:cxnSp>
-      <p:sp>
-        <p:nvSpPr>
-          <p:cNvPr id="112" name="TextBox 111">
-            <a:extLst>
-              <a:ext uri="{FF2B5EF4-FFF2-40B4-BE49-F238E27FC236}">
-                <a16:creationId xmlns:a16="http://schemas.microsoft.com/office/drawing/2014/main" id="{079A9A05-BB48-1546-A9A4-6BF71A388DD6}"/>
-              </a:ext>
-            </a:extLst>
-          </p:cNvPr>
-          <p:cNvSpPr txBox="1"/>
-          <p:nvPr/>
-        </p:nvSpPr>
-        <p:spPr>
-          <a:xfrm>
-            <a:off x="7738872" y="3528427"/>
-            <a:ext cx="301686" cy="369332"/>
-          </a:xfrm>
-          <a:prstGeom prst="rect">
-            <a:avLst/>
-          </a:prstGeom>
-          <a:noFill/>
-        </p:spPr>
-        <p:txBody>
-          <a:bodyPr wrap="none" rtlCol="0">
-            <a:spAutoFit/>
-          </a:bodyPr>
-          <a:lstStyle/>
-          <a:p>
-            <a:r>
-              <a:rPr lang="en-US" altLang="zh-CN" dirty="0"/>
-              <a:t>2</a:t>
-            </a:r>
-            <a:endParaRPr lang="en-CN" dirty="0"/>
-          </a:p>
-        </p:txBody>
-      </p:sp>
-      <p:sp>
-        <p:nvSpPr>
-          <p:cNvPr id="113" name="TextBox 112">
-            <a:extLst>
-              <a:ext uri="{FF2B5EF4-FFF2-40B4-BE49-F238E27FC236}">
-                <a16:creationId xmlns:a16="http://schemas.microsoft.com/office/drawing/2014/main" id="{8F61172F-9D8D-9B4C-AD92-44EBDFEE7D1B}"/>
-              </a:ext>
-            </a:extLst>
-          </p:cNvPr>
-          <p:cNvSpPr txBox="1"/>
-          <p:nvPr/>
-        </p:nvSpPr>
-        <p:spPr>
-          <a:xfrm>
-            <a:off x="6678766" y="5048486"/>
-            <a:ext cx="301686" cy="369332"/>
-          </a:xfrm>
-          <a:prstGeom prst="rect">
-            <a:avLst/>
-          </a:prstGeom>
-          <a:noFill/>
-        </p:spPr>
-        <p:txBody>
-          <a:bodyPr wrap="none" rtlCol="0">
-            <a:spAutoFit/>
-          </a:bodyPr>
-          <a:lstStyle/>
-          <a:p>
-            <a:r>
-              <a:rPr lang="en-US" altLang="zh-CN" dirty="0"/>
-              <a:t>4</a:t>
-            </a:r>
-            <a:endParaRPr lang="en-CN" dirty="0"/>
-          </a:p>
-        </p:txBody>
-      </p:sp>
-      <p:sp>
-        <p:nvSpPr>
-          <p:cNvPr id="114" name="TextBox 113">
-            <a:extLst>
-              <a:ext uri="{FF2B5EF4-FFF2-40B4-BE49-F238E27FC236}">
-                <a16:creationId xmlns:a16="http://schemas.microsoft.com/office/drawing/2014/main" id="{55EB5ECE-6E14-BC42-B221-71513CB78A8A}"/>
-              </a:ext>
-            </a:extLst>
-          </p:cNvPr>
-          <p:cNvSpPr txBox="1"/>
-          <p:nvPr/>
-        </p:nvSpPr>
-        <p:spPr>
-          <a:xfrm>
-            <a:off x="7830351" y="4947906"/>
-            <a:ext cx="301686" cy="369332"/>
-          </a:xfrm>
-          <a:prstGeom prst="rect">
-            <a:avLst/>
-          </a:prstGeom>
-          <a:noFill/>
-        </p:spPr>
-        <p:txBody>
-          <a:bodyPr wrap="none" rtlCol="0">
-            <a:spAutoFit/>
-          </a:bodyPr>
-          <a:lstStyle/>
-          <a:p>
-            <a:r>
-              <a:rPr lang="en-US" altLang="zh-CN" dirty="0"/>
-              <a:t>3</a:t>
-            </a:r>
-            <a:endParaRPr lang="en-CN" dirty="0"/>
-          </a:p>
-        </p:txBody>
-      </p:sp>
-      <p:sp>
-        <p:nvSpPr>
-          <p:cNvPr id="115" name="TextBox 114">
-            <a:extLst>
-              <a:ext uri="{FF2B5EF4-FFF2-40B4-BE49-F238E27FC236}">
-                <a16:creationId xmlns:a16="http://schemas.microsoft.com/office/drawing/2014/main" id="{8BAFABB9-B8EB-8348-B1B3-EDBFBA52E38C}"/>
-              </a:ext>
-            </a:extLst>
-          </p:cNvPr>
-          <p:cNvSpPr txBox="1"/>
-          <p:nvPr/>
-        </p:nvSpPr>
-        <p:spPr>
-          <a:xfrm>
-            <a:off x="9415738" y="5400950"/>
-            <a:ext cx="301686" cy="369332"/>
-          </a:xfrm>
-          <a:prstGeom prst="rect">
-            <a:avLst/>
-          </a:prstGeom>
-          <a:noFill/>
-        </p:spPr>
-        <p:txBody>
-          <a:bodyPr wrap="none" rtlCol="0">
-            <a:spAutoFit/>
-          </a:bodyPr>
-          <a:lstStyle/>
-          <a:p>
-            <a:r>
-              <a:rPr lang="en-US" altLang="zh-CN" dirty="0"/>
-              <a:t>1</a:t>
-            </a:r>
-            <a:endParaRPr lang="en-CN" dirty="0"/>
-          </a:p>
-        </p:txBody>
-      </p:sp>
-      <p:sp>
-        <p:nvSpPr>
-          <p:cNvPr id="116" name="TextBox 115">
-            <a:extLst>
-              <a:ext uri="{FF2B5EF4-FFF2-40B4-BE49-F238E27FC236}">
-                <a16:creationId xmlns:a16="http://schemas.microsoft.com/office/drawing/2014/main" id="{39C58F79-FCD7-E746-9177-BFCC6F4D8D46}"/>
-              </a:ext>
-            </a:extLst>
-          </p:cNvPr>
-          <p:cNvSpPr txBox="1"/>
-          <p:nvPr/>
-        </p:nvSpPr>
-        <p:spPr>
-          <a:xfrm>
-            <a:off x="8211853" y="4661073"/>
-            <a:ext cx="336952" cy="369332"/>
-          </a:xfrm>
-          <a:prstGeom prst="rect">
-            <a:avLst/>
-          </a:prstGeom>
-          <a:noFill/>
-        </p:spPr>
-        <p:txBody>
-          <a:bodyPr wrap="none" rtlCol="0">
-            <a:spAutoFit/>
-          </a:bodyPr>
-          <a:lstStyle/>
-          <a:p>
-            <a:r>
-              <a:rPr lang="en-CN" dirty="0"/>
-              <a:t>O</a:t>
-            </a:r>
-          </a:p>
-        </p:txBody>
-      </p:sp>
-      <p:cxnSp>
-        <p:nvCxnSpPr>
-          <p:cNvPr id="117" name="Straight Connector 116">
-            <a:extLst>
-              <a:ext uri="{FF2B5EF4-FFF2-40B4-BE49-F238E27FC236}">
-                <a16:creationId xmlns:a16="http://schemas.microsoft.com/office/drawing/2014/main" id="{D601B744-BB27-034F-A39D-E82DB03ADF13}"/>
-              </a:ext>
-            </a:extLst>
-          </p:cNvPr>
-          <p:cNvCxnSpPr>
-            <a:cxnSpLocks/>
-          </p:cNvCxnSpPr>
-          <p:nvPr/>
-        </p:nvCxnSpPr>
-        <p:spPr>
-          <a:xfrm flipH="1">
-            <a:off x="8327859" y="4492908"/>
-            <a:ext cx="224510" cy="117695"/>
-          </a:xfrm>
-          <a:prstGeom prst="line">
-            <a:avLst/>
-          </a:prstGeom>
-          <a:ln w="19050">
-            <a:prstDash val="dashDot"/>
-            <a:headEnd type="none"/>
-            <a:tailEnd type="oval"/>
-          </a:ln>
-        </p:spPr>
-        <p:style>
-          <a:lnRef idx="2">
-            <a:schemeClr val="dk1"/>
-          </a:lnRef>
-          <a:fillRef idx="0">
-            <a:schemeClr val="dk1"/>
-          </a:fillRef>
-          <a:effectRef idx="1">
-            <a:schemeClr val="dk1"/>
-          </a:effectRef>
-          <a:fontRef idx="minor">
-            <a:schemeClr val="tx1"/>
-          </a:fontRef>
-        </p:style>
-      </p:cxnSp>
-      <p:cxnSp>
-        <p:nvCxnSpPr>
           <p:cNvPr id="119" name="Straight Arrow Connector 118">
             <a:extLst>
               <a:ext uri="{FF2B5EF4-FFF2-40B4-BE49-F238E27FC236}">
@@ -5704,86 +4365,6 @@
           <a:xfrm>
             <a:off x="5286703" y="1461675"/>
             <a:ext cx="809297" cy="0"/>
-          </a:xfrm>
-          <a:prstGeom prst="straightConnector1">
-            <a:avLst/>
-          </a:prstGeom>
-          <a:ln>
-            <a:tailEnd type="triangle"/>
-          </a:ln>
-        </p:spPr>
-        <p:style>
-          <a:lnRef idx="3">
-            <a:schemeClr val="dk1"/>
-          </a:lnRef>
-          <a:fillRef idx="0">
-            <a:schemeClr val="dk1"/>
-          </a:fillRef>
-          <a:effectRef idx="2">
-            <a:schemeClr val="dk1"/>
-          </a:effectRef>
-          <a:fontRef idx="minor">
-            <a:schemeClr val="tx1"/>
-          </a:fontRef>
-        </p:style>
-      </p:cxnSp>
-      <p:cxnSp>
-        <p:nvCxnSpPr>
-          <p:cNvPr id="120" name="Straight Arrow Connector 119">
-            <a:extLst>
-              <a:ext uri="{FF2B5EF4-FFF2-40B4-BE49-F238E27FC236}">
-                <a16:creationId xmlns:a16="http://schemas.microsoft.com/office/drawing/2014/main" id="{3680598F-0204-1342-944E-64C6C3C8C73A}"/>
-              </a:ext>
-            </a:extLst>
-          </p:cNvPr>
-          <p:cNvCxnSpPr/>
-          <p:nvPr/>
-        </p:nvCxnSpPr>
-        <p:spPr>
-          <a:xfrm>
-            <a:off x="5213715" y="4695683"/>
-            <a:ext cx="809297" cy="0"/>
-          </a:xfrm>
-          <a:prstGeom prst="straightConnector1">
-            <a:avLst/>
-          </a:prstGeom>
-          <a:ln>
-            <a:tailEnd type="triangle"/>
-          </a:ln>
-        </p:spPr>
-        <p:style>
-          <a:lnRef idx="3">
-            <a:schemeClr val="dk1"/>
-          </a:lnRef>
-          <a:fillRef idx="0">
-            <a:schemeClr val="dk1"/>
-          </a:fillRef>
-          <a:effectRef idx="2">
-            <a:schemeClr val="dk1"/>
-          </a:effectRef>
-          <a:fontRef idx="minor">
-            <a:schemeClr val="tx1"/>
-          </a:fontRef>
-        </p:style>
-      </p:cxnSp>
-      <p:cxnSp>
-        <p:nvCxnSpPr>
-          <p:cNvPr id="121" name="Straight Arrow Connector 120">
-            <a:extLst>
-              <a:ext uri="{FF2B5EF4-FFF2-40B4-BE49-F238E27FC236}">
-                <a16:creationId xmlns:a16="http://schemas.microsoft.com/office/drawing/2014/main" id="{5771C08B-B21C-2C48-B518-A1821C4256A6}"/>
-              </a:ext>
-            </a:extLst>
-          </p:cNvPr>
-          <p:cNvCxnSpPr>
-            <a:cxnSpLocks/>
-          </p:cNvCxnSpPr>
-          <p:nvPr/>
-        </p:nvCxnSpPr>
-        <p:spPr>
-          <a:xfrm>
-            <a:off x="3824150" y="2976635"/>
-            <a:ext cx="0" cy="744418"/>
           </a:xfrm>
           <a:prstGeom prst="straightConnector1">
             <a:avLst/>
@@ -5862,8 +4443,8 @@
         </p:nvSpPr>
         <p:spPr>
           <a:xfrm>
-            <a:off x="5423338" y="1067540"/>
-            <a:ext cx="704039" cy="369332"/>
+            <a:off x="5098392" y="1107741"/>
+            <a:ext cx="1146468" cy="369332"/>
           </a:xfrm>
           <a:prstGeom prst="rect">
             <a:avLst/>
@@ -5881,7 +4462,14 @@
                 <a:latin typeface="Times New Roman" panose="02020603050405020304" pitchFamily="18" charset="0"/>
                 <a:cs typeface="Times New Roman" panose="02020603050405020304" pitchFamily="18" charset="0"/>
               </a:rPr>
-              <a:t>r</a:t>
+              <a:t> </a:t>
+            </a:r>
+            <a:r>
+              <a:rPr lang="en-US" dirty="0">
+                <a:latin typeface="Times New Roman" panose="02020603050405020304" pitchFamily="18" charset="0"/>
+                <a:cs typeface="Times New Roman" panose="02020603050405020304" pitchFamily="18" charset="0"/>
+              </a:rPr>
+              <a:t>O4 - </a:t>
             </a:r>
             <a:r>
               <a:rPr lang="en-US" dirty="0"/>
@@ -5893,10 +4481,10 @@
       </p:sp>
       <p:sp>
         <p:nvSpPr>
-          <p:cNvPr id="126" name="TextBox 125">
-            <a:extLst>
-              <a:ext uri="{FF2B5EF4-FFF2-40B4-BE49-F238E27FC236}">
-                <a16:creationId xmlns:a16="http://schemas.microsoft.com/office/drawing/2014/main" id="{4CDAD2E1-1878-E849-957E-A4FF2FA74062}"/>
+          <p:cNvPr id="128" name="TextBox 127">
+            <a:extLst>
+              <a:ext uri="{FF2B5EF4-FFF2-40B4-BE49-F238E27FC236}">
+                <a16:creationId xmlns:a16="http://schemas.microsoft.com/office/drawing/2014/main" id="{FBB3BA1D-20C0-5D48-A33D-C8A08CC7BC11}"/>
               </a:ext>
             </a:extLst>
           </p:cNvPr>
@@ -5905,8 +4493,8 @@
         </p:nvSpPr>
         <p:spPr>
           <a:xfrm>
-            <a:off x="5284153" y="4226421"/>
-            <a:ext cx="704039" cy="369332"/>
+            <a:off x="8551433" y="2956799"/>
+            <a:ext cx="1069524" cy="646331"/>
           </a:xfrm>
           <a:prstGeom prst="rect">
             <a:avLst/>
@@ -5919,48 +4507,15 @@
           </a:bodyPr>
           <a:lstStyle/>
           <a:p>
-            <a:r>
-              <a:rPr lang="en-US" i="1" dirty="0">
+            <a:pPr algn="ctr"/>
+            <a:r>
+              <a:rPr lang="en-US" dirty="0">
                 <a:latin typeface="Times New Roman" panose="02020603050405020304" pitchFamily="18" charset="0"/>
                 <a:cs typeface="Times New Roman" panose="02020603050405020304" pitchFamily="18" charset="0"/>
               </a:rPr>
-              <a:t>r</a:t>
-            </a:r>
-            <a:r>
-              <a:rPr lang="en-US" dirty="0"/>
-              <a:t>120°</a:t>
-            </a:r>
-            <a:endParaRPr lang="en-CN" dirty="0"/>
-          </a:p>
-        </p:txBody>
-      </p:sp>
-      <p:sp>
-        <p:nvSpPr>
-          <p:cNvPr id="127" name="TextBox 126">
-            <a:extLst>
-              <a:ext uri="{FF2B5EF4-FFF2-40B4-BE49-F238E27FC236}">
-                <a16:creationId xmlns:a16="http://schemas.microsoft.com/office/drawing/2014/main" id="{E5E43D08-8A74-8646-A88E-EF53D4316F2C}"/>
-              </a:ext>
-            </a:extLst>
-          </p:cNvPr>
-          <p:cNvSpPr txBox="1"/>
-          <p:nvPr/>
-        </p:nvSpPr>
-        <p:spPr>
-          <a:xfrm>
-            <a:off x="3875648" y="3063554"/>
-            <a:ext cx="1069524" cy="369332"/>
-          </a:xfrm>
-          <a:prstGeom prst="rect">
-            <a:avLst/>
-          </a:prstGeom>
-          <a:noFill/>
-        </p:spPr>
-        <p:txBody>
-          <a:bodyPr wrap="none" rtlCol="0">
-            <a:spAutoFit/>
-          </a:bodyPr>
-          <a:lstStyle/>
+              <a:t>O13 - </a:t>
+            </a:r>
+          </a:p>
           <a:p>
             <a:r>
               <a:rPr lang="en-US" dirty="0">
@@ -5976,12 +4531,248 @@
           </a:p>
         </p:txBody>
       </p:sp>
-      <p:sp>
-        <p:nvSpPr>
-          <p:cNvPr id="128" name="TextBox 127">
-            <a:extLst>
-              <a:ext uri="{FF2B5EF4-FFF2-40B4-BE49-F238E27FC236}">
-                <a16:creationId xmlns:a16="http://schemas.microsoft.com/office/drawing/2014/main" id="{FBB3BA1D-20C0-5D48-A33D-C8A08CC7BC11}"/>
+      <p:cxnSp>
+        <p:nvCxnSpPr>
+          <p:cNvPr id="88" name="Straight Connector 87">
+            <a:extLst>
+              <a:ext uri="{FF2B5EF4-FFF2-40B4-BE49-F238E27FC236}">
+                <a16:creationId xmlns:a16="http://schemas.microsoft.com/office/drawing/2014/main" id="{1C8F2563-7DA4-864C-9632-DC28346CDF3E}"/>
+              </a:ext>
+            </a:extLst>
+          </p:cNvPr>
+          <p:cNvCxnSpPr>
+            <a:cxnSpLocks/>
+          </p:cNvCxnSpPr>
+          <p:nvPr/>
+        </p:nvCxnSpPr>
+        <p:spPr>
+          <a:xfrm>
+            <a:off x="7849089" y="3881365"/>
+            <a:ext cx="0" cy="1681656"/>
+          </a:xfrm>
+          <a:prstGeom prst="line">
+            <a:avLst/>
+          </a:prstGeom>
+          <a:ln w="19050"/>
+        </p:spPr>
+        <p:style>
+          <a:lnRef idx="2">
+            <a:schemeClr val="dk1"/>
+          </a:lnRef>
+          <a:fillRef idx="0">
+            <a:schemeClr val="dk1"/>
+          </a:fillRef>
+          <a:effectRef idx="1">
+            <a:schemeClr val="dk1"/>
+          </a:effectRef>
+          <a:fontRef idx="minor">
+            <a:schemeClr val="tx1"/>
+          </a:fontRef>
+        </p:style>
+      </p:cxnSp>
+      <p:cxnSp>
+        <p:nvCxnSpPr>
+          <p:cNvPr id="89" name="Straight Connector 88">
+            <a:extLst>
+              <a:ext uri="{FF2B5EF4-FFF2-40B4-BE49-F238E27FC236}">
+                <a16:creationId xmlns:a16="http://schemas.microsoft.com/office/drawing/2014/main" id="{BC039221-A3DC-2647-8E11-CEB2B7A90DBB}"/>
+              </a:ext>
+            </a:extLst>
+          </p:cNvPr>
+          <p:cNvCxnSpPr>
+            <a:cxnSpLocks/>
+          </p:cNvCxnSpPr>
+          <p:nvPr/>
+        </p:nvCxnSpPr>
+        <p:spPr>
+          <a:xfrm flipH="1">
+            <a:off x="6955710" y="3881365"/>
+            <a:ext cx="893380" cy="1177159"/>
+          </a:xfrm>
+          <a:prstGeom prst="line">
+            <a:avLst/>
+          </a:prstGeom>
+          <a:ln w="19050"/>
+        </p:spPr>
+        <p:style>
+          <a:lnRef idx="2">
+            <a:schemeClr val="dk1"/>
+          </a:lnRef>
+          <a:fillRef idx="0">
+            <a:schemeClr val="dk1"/>
+          </a:fillRef>
+          <a:effectRef idx="1">
+            <a:schemeClr val="dk1"/>
+          </a:effectRef>
+          <a:fontRef idx="minor">
+            <a:schemeClr val="tx1"/>
+          </a:fontRef>
+        </p:style>
+      </p:cxnSp>
+      <p:cxnSp>
+        <p:nvCxnSpPr>
+          <p:cNvPr id="90" name="Straight Connector 89">
+            <a:extLst>
+              <a:ext uri="{FF2B5EF4-FFF2-40B4-BE49-F238E27FC236}">
+                <a16:creationId xmlns:a16="http://schemas.microsoft.com/office/drawing/2014/main" id="{7304023F-2E3C-0B42-9000-DF85D6DECC78}"/>
+              </a:ext>
+            </a:extLst>
+          </p:cNvPr>
+          <p:cNvCxnSpPr>
+            <a:cxnSpLocks/>
+          </p:cNvCxnSpPr>
+          <p:nvPr/>
+        </p:nvCxnSpPr>
+        <p:spPr>
+          <a:xfrm flipH="1" flipV="1">
+            <a:off x="6955710" y="5058524"/>
+            <a:ext cx="893379" cy="504497"/>
+          </a:xfrm>
+          <a:prstGeom prst="line">
+            <a:avLst/>
+          </a:prstGeom>
+          <a:ln w="19050"/>
+        </p:spPr>
+        <p:style>
+          <a:lnRef idx="2">
+            <a:schemeClr val="dk1"/>
+          </a:lnRef>
+          <a:fillRef idx="0">
+            <a:schemeClr val="dk1"/>
+          </a:fillRef>
+          <a:effectRef idx="1">
+            <a:schemeClr val="dk1"/>
+          </a:effectRef>
+          <a:fontRef idx="minor">
+            <a:schemeClr val="tx1"/>
+          </a:fontRef>
+        </p:style>
+      </p:cxnSp>
+      <p:cxnSp>
+        <p:nvCxnSpPr>
+          <p:cNvPr id="91" name="Straight Connector 90">
+            <a:extLst>
+              <a:ext uri="{FF2B5EF4-FFF2-40B4-BE49-F238E27FC236}">
+                <a16:creationId xmlns:a16="http://schemas.microsoft.com/office/drawing/2014/main" id="{BBEBBBB0-EB01-7F4B-AD30-FCACAAAC17B1}"/>
+              </a:ext>
+            </a:extLst>
+          </p:cNvPr>
+          <p:cNvCxnSpPr>
+            <a:cxnSpLocks/>
+          </p:cNvCxnSpPr>
+          <p:nvPr/>
+        </p:nvCxnSpPr>
+        <p:spPr>
+          <a:xfrm flipH="1">
+            <a:off x="7849090" y="5058524"/>
+            <a:ext cx="1229710" cy="504498"/>
+          </a:xfrm>
+          <a:prstGeom prst="line">
+            <a:avLst/>
+          </a:prstGeom>
+          <a:ln w="19050"/>
+        </p:spPr>
+        <p:style>
+          <a:lnRef idx="2">
+            <a:schemeClr val="dk1"/>
+          </a:lnRef>
+          <a:fillRef idx="0">
+            <a:schemeClr val="dk1"/>
+          </a:fillRef>
+          <a:effectRef idx="1">
+            <a:schemeClr val="dk1"/>
+          </a:effectRef>
+          <a:fontRef idx="minor">
+            <a:schemeClr val="tx1"/>
+          </a:fontRef>
+        </p:style>
+      </p:cxnSp>
+      <p:cxnSp>
+        <p:nvCxnSpPr>
+          <p:cNvPr id="92" name="Straight Connector 91">
+            <a:extLst>
+              <a:ext uri="{FF2B5EF4-FFF2-40B4-BE49-F238E27FC236}">
+                <a16:creationId xmlns:a16="http://schemas.microsoft.com/office/drawing/2014/main" id="{8C35B8F5-A835-5D47-83A2-006505083CC6}"/>
+              </a:ext>
+            </a:extLst>
+          </p:cNvPr>
+          <p:cNvCxnSpPr>
+            <a:cxnSpLocks/>
+          </p:cNvCxnSpPr>
+          <p:nvPr/>
+        </p:nvCxnSpPr>
+        <p:spPr>
+          <a:xfrm flipH="1" flipV="1">
+            <a:off x="7849089" y="3881365"/>
+            <a:ext cx="1229711" cy="1177159"/>
+          </a:xfrm>
+          <a:prstGeom prst="line">
+            <a:avLst/>
+          </a:prstGeom>
+          <a:ln w="19050"/>
+        </p:spPr>
+        <p:style>
+          <a:lnRef idx="2">
+            <a:schemeClr val="dk1"/>
+          </a:lnRef>
+          <a:fillRef idx="0">
+            <a:schemeClr val="dk1"/>
+          </a:fillRef>
+          <a:effectRef idx="1">
+            <a:schemeClr val="dk1"/>
+          </a:effectRef>
+          <a:fontRef idx="minor">
+            <a:schemeClr val="tx1"/>
+          </a:fontRef>
+        </p:style>
+      </p:cxnSp>
+      <p:cxnSp>
+        <p:nvCxnSpPr>
+          <p:cNvPr id="93" name="Straight Connector 92">
+            <a:extLst>
+              <a:ext uri="{FF2B5EF4-FFF2-40B4-BE49-F238E27FC236}">
+                <a16:creationId xmlns:a16="http://schemas.microsoft.com/office/drawing/2014/main" id="{8A5EBA61-3AF8-CE49-8A26-F1D5263C0C46}"/>
+              </a:ext>
+            </a:extLst>
+          </p:cNvPr>
+          <p:cNvCxnSpPr>
+            <a:cxnSpLocks/>
+          </p:cNvCxnSpPr>
+          <p:nvPr/>
+        </p:nvCxnSpPr>
+        <p:spPr>
+          <a:xfrm flipH="1">
+            <a:off x="6955709" y="5058524"/>
+            <a:ext cx="2123091" cy="1"/>
+          </a:xfrm>
+          <a:prstGeom prst="line">
+            <a:avLst/>
+          </a:prstGeom>
+          <a:ln w="19050">
+            <a:prstDash val="dash"/>
+          </a:ln>
+        </p:spPr>
+        <p:style>
+          <a:lnRef idx="2">
+            <a:schemeClr val="dk1"/>
+          </a:lnRef>
+          <a:fillRef idx="0">
+            <a:schemeClr val="dk1"/>
+          </a:fillRef>
+          <a:effectRef idx="1">
+            <a:schemeClr val="dk1"/>
+          </a:effectRef>
+          <a:fontRef idx="minor">
+            <a:schemeClr val="tx1"/>
+          </a:fontRef>
+        </p:style>
+      </p:cxnSp>
+      <p:sp>
+        <p:nvSpPr>
+          <p:cNvPr id="98" name="TextBox 97">
+            <a:extLst>
+              <a:ext uri="{FF2B5EF4-FFF2-40B4-BE49-F238E27FC236}">
+                <a16:creationId xmlns:a16="http://schemas.microsoft.com/office/drawing/2014/main" id="{09B64788-CFF9-234C-BAEE-7F9684813213}"/>
               </a:ext>
             </a:extLst>
           </p:cNvPr>
@@ -5990,8 +4781,8 @@
         </p:nvSpPr>
         <p:spPr>
           <a:xfrm>
-            <a:off x="8593431" y="3077720"/>
-            <a:ext cx="1069524" cy="369332"/>
+            <a:off x="7575820" y="3653926"/>
+            <a:ext cx="301686" cy="369332"/>
           </a:xfrm>
           <a:prstGeom prst="rect">
             <a:avLst/>
@@ -6005,19 +4796,238 @@
           <a:lstStyle/>
           <a:p>
             <a:r>
-              <a:rPr lang="en-US" dirty="0">
-                <a:latin typeface="Times New Roman" panose="02020603050405020304" pitchFamily="18" charset="0"/>
-                <a:cs typeface="Times New Roman" panose="02020603050405020304" pitchFamily="18" charset="0"/>
-              </a:rPr>
-              <a:t>reflection</a:t>
-            </a:r>
-            <a:endParaRPr lang="en-CN" dirty="0">
-              <a:latin typeface="Times New Roman" panose="02020603050405020304" pitchFamily="18" charset="0"/>
-              <a:cs typeface="Times New Roman" panose="02020603050405020304" pitchFamily="18" charset="0"/>
-            </a:endParaRPr>
-          </a:p>
-        </p:txBody>
-      </p:sp>
+              <a:rPr lang="en-US" dirty="0"/>
+              <a:t>3</a:t>
+            </a:r>
+            <a:endParaRPr lang="en-CN" dirty="0"/>
+          </a:p>
+        </p:txBody>
+      </p:sp>
+      <p:sp>
+        <p:nvSpPr>
+          <p:cNvPr id="99" name="TextBox 98">
+            <a:extLst>
+              <a:ext uri="{FF2B5EF4-FFF2-40B4-BE49-F238E27FC236}">
+                <a16:creationId xmlns:a16="http://schemas.microsoft.com/office/drawing/2014/main" id="{2A801D69-5DCE-CE45-9B7B-3F07D46B1D5A}"/>
+              </a:ext>
+            </a:extLst>
+          </p:cNvPr>
+          <p:cNvSpPr txBox="1"/>
+          <p:nvPr/>
+        </p:nvSpPr>
+        <p:spPr>
+          <a:xfrm>
+            <a:off x="6556317" y="4894881"/>
+            <a:ext cx="301686" cy="369332"/>
+          </a:xfrm>
+          <a:prstGeom prst="rect">
+            <a:avLst/>
+          </a:prstGeom>
+          <a:noFill/>
+        </p:spPr>
+        <p:txBody>
+          <a:bodyPr wrap="none" rtlCol="0">
+            <a:spAutoFit/>
+          </a:bodyPr>
+          <a:lstStyle/>
+          <a:p>
+            <a:r>
+              <a:rPr lang="en-US" dirty="0"/>
+              <a:t>1</a:t>
+            </a:r>
+            <a:endParaRPr lang="en-CN" dirty="0"/>
+          </a:p>
+        </p:txBody>
+      </p:sp>
+      <p:sp>
+        <p:nvSpPr>
+          <p:cNvPr id="100" name="TextBox 99">
+            <a:extLst>
+              <a:ext uri="{FF2B5EF4-FFF2-40B4-BE49-F238E27FC236}">
+                <a16:creationId xmlns:a16="http://schemas.microsoft.com/office/drawing/2014/main" id="{72A880E2-B449-2D4C-9FAB-5D231C4BB083}"/>
+              </a:ext>
+            </a:extLst>
+          </p:cNvPr>
+          <p:cNvSpPr txBox="1"/>
+          <p:nvPr/>
+        </p:nvSpPr>
+        <p:spPr>
+          <a:xfrm>
+            <a:off x="7568425" y="5563021"/>
+            <a:ext cx="301686" cy="369332"/>
+          </a:xfrm>
+          <a:prstGeom prst="rect">
+            <a:avLst/>
+          </a:prstGeom>
+          <a:noFill/>
+        </p:spPr>
+        <p:txBody>
+          <a:bodyPr wrap="none" rtlCol="0">
+            <a:spAutoFit/>
+          </a:bodyPr>
+          <a:lstStyle/>
+          <a:p>
+            <a:r>
+              <a:rPr lang="en-US" altLang="zh-CN" dirty="0"/>
+              <a:t>4</a:t>
+            </a:r>
+            <a:endParaRPr lang="en-CN" dirty="0"/>
+          </a:p>
+        </p:txBody>
+      </p:sp>
+      <p:sp>
+        <p:nvSpPr>
+          <p:cNvPr id="101" name="TextBox 100">
+            <a:extLst>
+              <a:ext uri="{FF2B5EF4-FFF2-40B4-BE49-F238E27FC236}">
+                <a16:creationId xmlns:a16="http://schemas.microsoft.com/office/drawing/2014/main" id="{A695E2CA-BAA8-6F43-B8F7-F3896004BB40}"/>
+              </a:ext>
+            </a:extLst>
+          </p:cNvPr>
+          <p:cNvSpPr txBox="1"/>
+          <p:nvPr/>
+        </p:nvSpPr>
+        <p:spPr>
+          <a:xfrm>
+            <a:off x="8927957" y="5180551"/>
+            <a:ext cx="301686" cy="369332"/>
+          </a:xfrm>
+          <a:prstGeom prst="rect">
+            <a:avLst/>
+          </a:prstGeom>
+          <a:noFill/>
+        </p:spPr>
+        <p:txBody>
+          <a:bodyPr wrap="none" rtlCol="0">
+            <a:spAutoFit/>
+          </a:bodyPr>
+          <a:lstStyle/>
+          <a:p>
+            <a:r>
+              <a:rPr lang="en-US" altLang="zh-CN" dirty="0"/>
+              <a:t>2</a:t>
+            </a:r>
+            <a:endParaRPr lang="en-CN" dirty="0"/>
+          </a:p>
+        </p:txBody>
+      </p:sp>
+      <p:sp>
+        <p:nvSpPr>
+          <p:cNvPr id="111" name="TextBox 110">
+            <a:extLst>
+              <a:ext uri="{FF2B5EF4-FFF2-40B4-BE49-F238E27FC236}">
+                <a16:creationId xmlns:a16="http://schemas.microsoft.com/office/drawing/2014/main" id="{4009C01E-2B06-6545-8CC6-1E4228C0EDD5}"/>
+              </a:ext>
+            </a:extLst>
+          </p:cNvPr>
+          <p:cNvSpPr txBox="1"/>
+          <p:nvPr/>
+        </p:nvSpPr>
+        <p:spPr>
+          <a:xfrm>
+            <a:off x="8039832" y="4479718"/>
+            <a:ext cx="336952" cy="369332"/>
+          </a:xfrm>
+          <a:prstGeom prst="rect">
+            <a:avLst/>
+          </a:prstGeom>
+          <a:noFill/>
+        </p:spPr>
+        <p:txBody>
+          <a:bodyPr wrap="none" rtlCol="0">
+            <a:spAutoFit/>
+          </a:bodyPr>
+          <a:lstStyle/>
+          <a:p>
+            <a:r>
+              <a:rPr lang="en-CN" dirty="0"/>
+              <a:t>O</a:t>
+            </a:r>
+          </a:p>
+        </p:txBody>
+      </p:sp>
+      <p:cxnSp>
+        <p:nvCxnSpPr>
+          <p:cNvPr id="118" name="Straight Connector 117">
+            <a:extLst>
+              <a:ext uri="{FF2B5EF4-FFF2-40B4-BE49-F238E27FC236}">
+                <a16:creationId xmlns:a16="http://schemas.microsoft.com/office/drawing/2014/main" id="{F1B97594-4A7A-4E46-A143-105A34989590}"/>
+              </a:ext>
+            </a:extLst>
+          </p:cNvPr>
+          <p:cNvCxnSpPr>
+            <a:cxnSpLocks/>
+          </p:cNvCxnSpPr>
+          <p:nvPr/>
+        </p:nvCxnSpPr>
+        <p:spPr>
+          <a:xfrm>
+            <a:off x="7849089" y="942160"/>
+            <a:ext cx="561364" cy="1409350"/>
+          </a:xfrm>
+          <a:prstGeom prst="line">
+            <a:avLst/>
+          </a:prstGeom>
+          <a:ln w="19050">
+            <a:prstDash val="dashDot"/>
+          </a:ln>
+        </p:spPr>
+        <p:style>
+          <a:lnRef idx="2">
+            <a:schemeClr val="dk1"/>
+          </a:lnRef>
+          <a:fillRef idx="0">
+            <a:schemeClr val="dk1"/>
+          </a:fillRef>
+          <a:effectRef idx="1">
+            <a:schemeClr val="dk1"/>
+          </a:effectRef>
+          <a:fontRef idx="minor">
+            <a:schemeClr val="tx1"/>
+          </a:fontRef>
+        </p:style>
+      </p:cxnSp>
+      <p:cxnSp>
+        <p:nvCxnSpPr>
+          <p:cNvPr id="122" name="Straight Connector 121">
+            <a:extLst>
+              <a:ext uri="{FF2B5EF4-FFF2-40B4-BE49-F238E27FC236}">
+                <a16:creationId xmlns:a16="http://schemas.microsoft.com/office/drawing/2014/main" id="{CAA90BD7-D443-2249-9D1A-7A1F346FD8B7}"/>
+              </a:ext>
+            </a:extLst>
+          </p:cNvPr>
+          <p:cNvCxnSpPr>
+            <a:cxnSpLocks/>
+          </p:cNvCxnSpPr>
+          <p:nvPr/>
+        </p:nvCxnSpPr>
+        <p:spPr>
+          <a:xfrm>
+            <a:off x="6989379" y="2110690"/>
+            <a:ext cx="1421074" cy="271282"/>
+          </a:xfrm>
+          <a:prstGeom prst="line">
+            <a:avLst/>
+          </a:prstGeom>
+          <a:ln w="19050">
+            <a:prstDash val="dashDot"/>
+          </a:ln>
+        </p:spPr>
+        <p:style>
+          <a:lnRef idx="2">
+            <a:schemeClr val="dk1"/>
+          </a:lnRef>
+          <a:fillRef idx="0">
+            <a:schemeClr val="dk1"/>
+          </a:fillRef>
+          <a:effectRef idx="1">
+            <a:schemeClr val="dk1"/>
+          </a:effectRef>
+          <a:fontRef idx="minor">
+            <a:schemeClr val="tx1"/>
+          </a:fontRef>
+        </p:style>
+      </p:cxnSp>
     </p:spTree>
     <p:extLst>
       <p:ext uri="{BB962C8B-B14F-4D97-AF65-F5344CB8AC3E}">

</xml_diff>